<commit_message>
Added new folder and report
</commit_message>
<xml_diff>
--- a/project/report/Diagrams.pptx
+++ b/project/report/Diagrams.pptx
@@ -263,7 +263,7 @@
           <a:p>
             <a:fld id="{E51E70AA-B246-435D-A5C7-444FBA7F1AA5}" type="datetimeFigureOut">
               <a:rPr lang="en-IN" smtClean="0"/>
-              <a:t>15-02-2019</a:t>
+              <a:t>30-04-2019</a:t>
             </a:fld>
             <a:endParaRPr lang="en-IN"/>
           </a:p>
@@ -463,7 +463,7 @@
           <a:p>
             <a:fld id="{E51E70AA-B246-435D-A5C7-444FBA7F1AA5}" type="datetimeFigureOut">
               <a:rPr lang="en-IN" smtClean="0"/>
-              <a:t>15-02-2019</a:t>
+              <a:t>30-04-2019</a:t>
             </a:fld>
             <a:endParaRPr lang="en-IN"/>
           </a:p>
@@ -673,7 +673,7 @@
           <a:p>
             <a:fld id="{E51E70AA-B246-435D-A5C7-444FBA7F1AA5}" type="datetimeFigureOut">
               <a:rPr lang="en-IN" smtClean="0"/>
-              <a:t>15-02-2019</a:t>
+              <a:t>30-04-2019</a:t>
             </a:fld>
             <a:endParaRPr lang="en-IN"/>
           </a:p>
@@ -873,7 +873,7 @@
           <a:p>
             <a:fld id="{E51E70AA-B246-435D-A5C7-444FBA7F1AA5}" type="datetimeFigureOut">
               <a:rPr lang="en-IN" smtClean="0"/>
-              <a:t>15-02-2019</a:t>
+              <a:t>30-04-2019</a:t>
             </a:fld>
             <a:endParaRPr lang="en-IN"/>
           </a:p>
@@ -1149,7 +1149,7 @@
           <a:p>
             <a:fld id="{E51E70AA-B246-435D-A5C7-444FBA7F1AA5}" type="datetimeFigureOut">
               <a:rPr lang="en-IN" smtClean="0"/>
-              <a:t>15-02-2019</a:t>
+              <a:t>30-04-2019</a:t>
             </a:fld>
             <a:endParaRPr lang="en-IN"/>
           </a:p>
@@ -1417,7 +1417,7 @@
           <a:p>
             <a:fld id="{E51E70AA-B246-435D-A5C7-444FBA7F1AA5}" type="datetimeFigureOut">
               <a:rPr lang="en-IN" smtClean="0"/>
-              <a:t>15-02-2019</a:t>
+              <a:t>30-04-2019</a:t>
             </a:fld>
             <a:endParaRPr lang="en-IN"/>
           </a:p>
@@ -1832,7 +1832,7 @@
           <a:p>
             <a:fld id="{E51E70AA-B246-435D-A5C7-444FBA7F1AA5}" type="datetimeFigureOut">
               <a:rPr lang="en-IN" smtClean="0"/>
-              <a:t>15-02-2019</a:t>
+              <a:t>30-04-2019</a:t>
             </a:fld>
             <a:endParaRPr lang="en-IN"/>
           </a:p>
@@ -1974,7 +1974,7 @@
           <a:p>
             <a:fld id="{E51E70AA-B246-435D-A5C7-444FBA7F1AA5}" type="datetimeFigureOut">
               <a:rPr lang="en-IN" smtClean="0"/>
-              <a:t>15-02-2019</a:t>
+              <a:t>30-04-2019</a:t>
             </a:fld>
             <a:endParaRPr lang="en-IN"/>
           </a:p>
@@ -2087,7 +2087,7 @@
           <a:p>
             <a:fld id="{E51E70AA-B246-435D-A5C7-444FBA7F1AA5}" type="datetimeFigureOut">
               <a:rPr lang="en-IN" smtClean="0"/>
-              <a:t>15-02-2019</a:t>
+              <a:t>30-04-2019</a:t>
             </a:fld>
             <a:endParaRPr lang="en-IN"/>
           </a:p>
@@ -2400,7 +2400,7 @@
           <a:p>
             <a:fld id="{E51E70AA-B246-435D-A5C7-444FBA7F1AA5}" type="datetimeFigureOut">
               <a:rPr lang="en-IN" smtClean="0"/>
-              <a:t>15-02-2019</a:t>
+              <a:t>30-04-2019</a:t>
             </a:fld>
             <a:endParaRPr lang="en-IN"/>
           </a:p>
@@ -2689,7 +2689,7 @@
           <a:p>
             <a:fld id="{E51E70AA-B246-435D-A5C7-444FBA7F1AA5}" type="datetimeFigureOut">
               <a:rPr lang="en-IN" smtClean="0"/>
-              <a:t>15-02-2019</a:t>
+              <a:t>30-04-2019</a:t>
             </a:fld>
             <a:endParaRPr lang="en-IN"/>
           </a:p>
@@ -2932,7 +2932,7 @@
           <a:p>
             <a:fld id="{E51E70AA-B246-435D-A5C7-444FBA7F1AA5}" type="datetimeFigureOut">
               <a:rPr lang="en-IN" smtClean="0"/>
-              <a:t>15-02-2019</a:t>
+              <a:t>30-04-2019</a:t>
             </a:fld>
             <a:endParaRPr lang="en-IN"/>
           </a:p>
@@ -6525,101 +6525,81 @@
             <a:p>
               <a:r>
                 <a:rPr lang="en-IN" sz="1400" dirty="0"/>
-                <a:t>Cloud </a:t>
+                <a:t>Cloud TG Worker</a:t>
               </a:r>
+            </a:p>
+          </p:txBody>
+        </p:sp>
+        <p:sp>
+          <p:nvSpPr>
+            <p:cNvPr id="84" name="TextBox 83">
+              <a:extLst>
+                <a:ext uri="{FF2B5EF4-FFF2-40B4-BE49-F238E27FC236}">
+                  <a16:creationId xmlns:a16="http://schemas.microsoft.com/office/drawing/2014/main" id="{7BC0759B-ED52-46A4-A967-60EF0A0AAED1}"/>
+                </a:ext>
+              </a:extLst>
+            </p:cNvPr>
+            <p:cNvSpPr txBox="1"/>
+            <p:nvPr/>
+          </p:nvSpPr>
+          <p:spPr>
+            <a:xfrm>
+              <a:off x="5410199" y="733502"/>
+              <a:ext cx="1595308" cy="307777"/>
+            </a:xfrm>
+            <a:prstGeom prst="rect">
+              <a:avLst/>
+            </a:prstGeom>
+            <a:noFill/>
+          </p:spPr>
+          <p:txBody>
+            <a:bodyPr wrap="square" rtlCol="0">
+              <a:spAutoFit/>
+            </a:bodyPr>
+            <a:lstStyle/>
+            <a:p>
               <a:r>
-                <a:rPr lang="en-IN" sz="1400" dirty="0" err="1"/>
-                <a:t>GoDB</a:t>
+                <a:rPr lang="en-IN" sz="1400" dirty="0"/>
+                <a:t>Cloud TG Head</a:t>
+              </a:r>
+            </a:p>
+          </p:txBody>
+        </p:sp>
+        <p:sp>
+          <p:nvSpPr>
+            <p:cNvPr id="85" name="TextBox 84">
+              <a:extLst>
+                <a:ext uri="{FF2B5EF4-FFF2-40B4-BE49-F238E27FC236}">
+                  <a16:creationId xmlns:a16="http://schemas.microsoft.com/office/drawing/2014/main" id="{B8B4004C-F0E1-4268-B42E-04AC7C97F1DC}"/>
+                </a:ext>
+              </a:extLst>
+            </p:cNvPr>
+            <p:cNvSpPr txBox="1"/>
+            <p:nvPr/>
+          </p:nvSpPr>
+          <p:spPr>
+            <a:xfrm>
+              <a:off x="9169341" y="731405"/>
+              <a:ext cx="1723588" cy="307777"/>
+            </a:xfrm>
+            <a:prstGeom prst="rect">
+              <a:avLst/>
+            </a:prstGeom>
+            <a:noFill/>
+          </p:spPr>
+          <p:txBody>
+            <a:bodyPr wrap="square" rtlCol="0">
+              <a:spAutoFit/>
+            </a:bodyPr>
+            <a:lstStyle/>
+            <a:p>
+              <a:r>
+                <a:rPr lang="en-IN" sz="1400"/>
+                <a:t>Cloud TG </a:t>
               </a:r>
               <a:r>
                 <a:rPr lang="en-IN" sz="1400" dirty="0"/>
-                <a:t> Worker</a:t>
-              </a:r>
-            </a:p>
-          </p:txBody>
-        </p:sp>
-        <p:sp>
-          <p:nvSpPr>
-            <p:cNvPr id="84" name="TextBox 83">
-              <a:extLst>
-                <a:ext uri="{FF2B5EF4-FFF2-40B4-BE49-F238E27FC236}">
-                  <a16:creationId xmlns:a16="http://schemas.microsoft.com/office/drawing/2014/main" id="{7BC0759B-ED52-46A4-A967-60EF0A0AAED1}"/>
-                </a:ext>
-              </a:extLst>
-            </p:cNvPr>
-            <p:cNvSpPr txBox="1"/>
-            <p:nvPr/>
-          </p:nvSpPr>
-          <p:spPr>
-            <a:xfrm>
-              <a:off x="5410199" y="733502"/>
-              <a:ext cx="1595308" cy="307777"/>
-            </a:xfrm>
-            <a:prstGeom prst="rect">
-              <a:avLst/>
-            </a:prstGeom>
-            <a:noFill/>
-          </p:spPr>
-          <p:txBody>
-            <a:bodyPr wrap="square" rtlCol="0">
-              <a:spAutoFit/>
-            </a:bodyPr>
-            <a:lstStyle/>
-            <a:p>
-              <a:r>
-                <a:rPr lang="en-IN" sz="1400" dirty="0"/>
-                <a:t>Cloud </a:t>
-              </a:r>
-              <a:r>
-                <a:rPr lang="en-IN" sz="1400" dirty="0" err="1"/>
-                <a:t>GoDB</a:t>
-              </a:r>
-              <a:r>
-                <a:rPr lang="en-IN" sz="1400" dirty="0"/>
-                <a:t> Head</a:t>
-              </a:r>
-            </a:p>
-          </p:txBody>
-        </p:sp>
-        <p:sp>
-          <p:nvSpPr>
-            <p:cNvPr id="85" name="TextBox 84">
-              <a:extLst>
-                <a:ext uri="{FF2B5EF4-FFF2-40B4-BE49-F238E27FC236}">
-                  <a16:creationId xmlns:a16="http://schemas.microsoft.com/office/drawing/2014/main" id="{B8B4004C-F0E1-4268-B42E-04AC7C97F1DC}"/>
-                </a:ext>
-              </a:extLst>
-            </p:cNvPr>
-            <p:cNvSpPr txBox="1"/>
-            <p:nvPr/>
-          </p:nvSpPr>
-          <p:spPr>
-            <a:xfrm>
-              <a:off x="9169341" y="731405"/>
-              <a:ext cx="1723588" cy="307777"/>
-            </a:xfrm>
-            <a:prstGeom prst="rect">
-              <a:avLst/>
-            </a:prstGeom>
-            <a:noFill/>
-          </p:spPr>
-          <p:txBody>
-            <a:bodyPr wrap="square" rtlCol="0">
-              <a:spAutoFit/>
-            </a:bodyPr>
-            <a:lstStyle/>
-            <a:p>
-              <a:r>
-                <a:rPr lang="en-IN" sz="1400" dirty="0"/>
-                <a:t>Cloud </a:t>
-              </a:r>
-              <a:r>
-                <a:rPr lang="en-IN" sz="1400" dirty="0" err="1"/>
-                <a:t>GoDB</a:t>
-              </a:r>
-              <a:r>
-                <a:rPr lang="en-IN" sz="1400" dirty="0"/>
-                <a:t> Worker</a:t>
+                <a:t>Worker</a:t>
               </a:r>
             </a:p>
           </p:txBody>

</xml_diff>